<commit_message>
[016] CHANGED unibookmi report
</commit_message>
<xml_diff>
--- a/others/Relazione UniBookMi.pptx
+++ b/others/Relazione UniBookMi.pptx
@@ -5,7 +5,7 @@
     <p:sldMasterId id="2147483659" r:id="rId1"/>
   </p:sldMasterIdLst>
   <p:notesMasterIdLst>
-    <p:notesMasterId r:id="rId15"/>
+    <p:notesMasterId r:id="rId19"/>
   </p:notesMasterIdLst>
   <p:sldIdLst>
     <p:sldId id="256" r:id="rId2"/>
@@ -21,22 +21,26 @@
     <p:sldId id="266" r:id="rId12"/>
     <p:sldId id="267" r:id="rId13"/>
     <p:sldId id="268" r:id="rId14"/>
+    <p:sldId id="269" r:id="rId15"/>
+    <p:sldId id="270" r:id="rId16"/>
+    <p:sldId id="271" r:id="rId17"/>
+    <p:sldId id="272" r:id="rId18"/>
   </p:sldIdLst>
   <p:sldSz cx="9144000" cy="5143500" type="screen16x9"/>
   <p:notesSz cx="6858000" cy="9144000"/>
   <p:embeddedFontLst>
     <p:embeddedFont>
       <p:font typeface="Old Standard TT" pitchFamily="2" charset="77"/>
-      <p:regular r:id="rId16"/>
-      <p:bold r:id="rId17"/>
-      <p:italic r:id="rId18"/>
+      <p:regular r:id="rId20"/>
+      <p:bold r:id="rId21"/>
+      <p:italic r:id="rId22"/>
     </p:embeddedFont>
     <p:embeddedFont>
       <p:font typeface="Roboto" panose="02000000000000000000" pitchFamily="2" charset="0"/>
-      <p:regular r:id="rId19"/>
-      <p:bold r:id="rId20"/>
-      <p:italic r:id="rId21"/>
-      <p:boldItalic r:id="rId22"/>
+      <p:regular r:id="rId23"/>
+      <p:bold r:id="rId24"/>
+      <p:italic r:id="rId25"/>
+      <p:boldItalic r:id="rId26"/>
     </p:embeddedFont>
   </p:embeddedFontLst>
   <p:defaultTextStyle>
@@ -1331,6 +1335,514 @@
     <p:extLst>
       <p:ext uri="{BB962C8B-B14F-4D97-AF65-F5344CB8AC3E}">
         <p14:creationId xmlns:p14="http://schemas.microsoft.com/office/powerpoint/2010/main" val="1994440368"/>
+      </p:ext>
+    </p:extLst>
+  </p:cSld>
+  <p:clrMapOvr>
+    <a:masterClrMapping/>
+  </p:clrMapOvr>
+</p:notes>
+</file>
+
+<file path=ppt/notesSlides/notesSlide14.xml><?xml version="1.0" encoding="utf-8"?>
+<p:notes xmlns:a="http://schemas.openxmlformats.org/drawingml/2006/main" xmlns:r="http://schemas.openxmlformats.org/officeDocument/2006/relationships" xmlns:p="http://schemas.openxmlformats.org/presentationml/2006/main" showMasterSp="0" showMasterPhAnim="0">
+  <p:cSld>
+    <p:spTree>
+      <p:nvGrpSpPr>
+        <p:cNvPr id="1" name="Shape 96">
+          <a:extLst>
+            <a:ext uri="{FF2B5EF4-FFF2-40B4-BE49-F238E27FC236}">
+              <a16:creationId xmlns:a16="http://schemas.microsoft.com/office/drawing/2014/main" id="{274724CC-6029-7943-D481-92CE9F5EB6FF}"/>
+            </a:ext>
+          </a:extLst>
+        </p:cNvPr>
+        <p:cNvGrpSpPr/>
+        <p:nvPr/>
+      </p:nvGrpSpPr>
+      <p:grpSpPr>
+        <a:xfrm>
+          <a:off x="0" y="0"/>
+          <a:ext cx="0" cy="0"/>
+          <a:chOff x="0" y="0"/>
+          <a:chExt cx="0" cy="0"/>
+        </a:xfrm>
+      </p:grpSpPr>
+      <p:sp>
+        <p:nvSpPr>
+          <p:cNvPr id="97" name="Google Shape;97;g2a611630393_0_29:notes">
+            <a:extLst>
+              <a:ext uri="{FF2B5EF4-FFF2-40B4-BE49-F238E27FC236}">
+                <a16:creationId xmlns:a16="http://schemas.microsoft.com/office/drawing/2014/main" id="{3AB866F0-1F85-4BAC-F10D-3459502F10AB}"/>
+              </a:ext>
+            </a:extLst>
+          </p:cNvPr>
+          <p:cNvSpPr>
+            <a:spLocks noGrp="1" noRot="1" noChangeAspect="1"/>
+          </p:cNvSpPr>
+          <p:nvPr>
+            <p:ph type="sldImg" idx="2"/>
+          </p:nvPr>
+        </p:nvSpPr>
+        <p:spPr>
+          <a:xfrm>
+            <a:off x="381000" y="685800"/>
+            <a:ext cx="6096000" cy="3429000"/>
+          </a:xfrm>
+          <a:custGeom>
+            <a:avLst/>
+            <a:gdLst/>
+            <a:ahLst/>
+            <a:cxnLst/>
+            <a:rect l="l" t="t" r="r" b="b"/>
+            <a:pathLst>
+              <a:path w="120000" h="120000" extrusionOk="0">
+                <a:moveTo>
+                  <a:pt x="0" y="0"/>
+                </a:moveTo>
+                <a:lnTo>
+                  <a:pt x="120000" y="0"/>
+                </a:lnTo>
+                <a:lnTo>
+                  <a:pt x="120000" y="120000"/>
+                </a:lnTo>
+                <a:lnTo>
+                  <a:pt x="0" y="120000"/>
+                </a:lnTo>
+                <a:close/>
+              </a:path>
+            </a:pathLst>
+          </a:custGeom>
+        </p:spPr>
+      </p:sp>
+      <p:sp>
+        <p:nvSpPr>
+          <p:cNvPr id="98" name="Google Shape;98;g2a611630393_0_29:notes">
+            <a:extLst>
+              <a:ext uri="{FF2B5EF4-FFF2-40B4-BE49-F238E27FC236}">
+                <a16:creationId xmlns:a16="http://schemas.microsoft.com/office/drawing/2014/main" id="{0E33D044-3BDB-2227-32B6-DC41D3E4EE09}"/>
+              </a:ext>
+            </a:extLst>
+          </p:cNvPr>
+          <p:cNvSpPr txBox="1">
+            <a:spLocks noGrp="1"/>
+          </p:cNvSpPr>
+          <p:nvPr>
+            <p:ph type="body" idx="1"/>
+          </p:nvPr>
+        </p:nvSpPr>
+        <p:spPr>
+          <a:xfrm>
+            <a:off x="685800" y="4343400"/>
+            <a:ext cx="5486400" cy="4114800"/>
+          </a:xfrm>
+          <a:prstGeom prst="rect">
+            <a:avLst/>
+          </a:prstGeom>
+        </p:spPr>
+        <p:txBody>
+          <a:bodyPr spcFirstLastPara="1" wrap="square" lIns="91425" tIns="91425" rIns="91425" bIns="91425" anchor="t" anchorCtr="0">
+            <a:noAutofit/>
+          </a:bodyPr>
+          <a:lstStyle/>
+          <a:p>
+            <a:pPr marL="0" lvl="0" indent="0" algn="l" rtl="0">
+              <a:spcBef>
+                <a:spcPts val="0"/>
+              </a:spcBef>
+              <a:spcAft>
+                <a:spcPts val="0"/>
+              </a:spcAft>
+              <a:buNone/>
+            </a:pPr>
+            <a:endParaRPr/>
+          </a:p>
+        </p:txBody>
+      </p:sp>
+    </p:spTree>
+    <p:extLst>
+      <p:ext uri="{BB962C8B-B14F-4D97-AF65-F5344CB8AC3E}">
+        <p14:creationId xmlns:p14="http://schemas.microsoft.com/office/powerpoint/2010/main" val="2108764270"/>
+      </p:ext>
+    </p:extLst>
+  </p:cSld>
+  <p:clrMapOvr>
+    <a:masterClrMapping/>
+  </p:clrMapOvr>
+</p:notes>
+</file>
+
+<file path=ppt/notesSlides/notesSlide15.xml><?xml version="1.0" encoding="utf-8"?>
+<p:notes xmlns:a="http://schemas.openxmlformats.org/drawingml/2006/main" xmlns:r="http://schemas.openxmlformats.org/officeDocument/2006/relationships" xmlns:p="http://schemas.openxmlformats.org/presentationml/2006/main" showMasterSp="0" showMasterPhAnim="0">
+  <p:cSld>
+    <p:spTree>
+      <p:nvGrpSpPr>
+        <p:cNvPr id="1" name="Shape 96">
+          <a:extLst>
+            <a:ext uri="{FF2B5EF4-FFF2-40B4-BE49-F238E27FC236}">
+              <a16:creationId xmlns:a16="http://schemas.microsoft.com/office/drawing/2014/main" id="{7C4C5988-5707-4523-B798-CCDD779DC1C0}"/>
+            </a:ext>
+          </a:extLst>
+        </p:cNvPr>
+        <p:cNvGrpSpPr/>
+        <p:nvPr/>
+      </p:nvGrpSpPr>
+      <p:grpSpPr>
+        <a:xfrm>
+          <a:off x="0" y="0"/>
+          <a:ext cx="0" cy="0"/>
+          <a:chOff x="0" y="0"/>
+          <a:chExt cx="0" cy="0"/>
+        </a:xfrm>
+      </p:grpSpPr>
+      <p:sp>
+        <p:nvSpPr>
+          <p:cNvPr id="97" name="Google Shape;97;g2a611630393_0_29:notes">
+            <a:extLst>
+              <a:ext uri="{FF2B5EF4-FFF2-40B4-BE49-F238E27FC236}">
+                <a16:creationId xmlns:a16="http://schemas.microsoft.com/office/drawing/2014/main" id="{56580F14-B29F-3858-B148-331F5F325041}"/>
+              </a:ext>
+            </a:extLst>
+          </p:cNvPr>
+          <p:cNvSpPr>
+            <a:spLocks noGrp="1" noRot="1" noChangeAspect="1"/>
+          </p:cNvSpPr>
+          <p:nvPr>
+            <p:ph type="sldImg" idx="2"/>
+          </p:nvPr>
+        </p:nvSpPr>
+        <p:spPr>
+          <a:xfrm>
+            <a:off x="381000" y="685800"/>
+            <a:ext cx="6096000" cy="3429000"/>
+          </a:xfrm>
+          <a:custGeom>
+            <a:avLst/>
+            <a:gdLst/>
+            <a:ahLst/>
+            <a:cxnLst/>
+            <a:rect l="l" t="t" r="r" b="b"/>
+            <a:pathLst>
+              <a:path w="120000" h="120000" extrusionOk="0">
+                <a:moveTo>
+                  <a:pt x="0" y="0"/>
+                </a:moveTo>
+                <a:lnTo>
+                  <a:pt x="120000" y="0"/>
+                </a:lnTo>
+                <a:lnTo>
+                  <a:pt x="120000" y="120000"/>
+                </a:lnTo>
+                <a:lnTo>
+                  <a:pt x="0" y="120000"/>
+                </a:lnTo>
+                <a:close/>
+              </a:path>
+            </a:pathLst>
+          </a:custGeom>
+        </p:spPr>
+      </p:sp>
+      <p:sp>
+        <p:nvSpPr>
+          <p:cNvPr id="98" name="Google Shape;98;g2a611630393_0_29:notes">
+            <a:extLst>
+              <a:ext uri="{FF2B5EF4-FFF2-40B4-BE49-F238E27FC236}">
+                <a16:creationId xmlns:a16="http://schemas.microsoft.com/office/drawing/2014/main" id="{3E8EF8C1-97EE-C9EC-79B4-8BBD08BA22B2}"/>
+              </a:ext>
+            </a:extLst>
+          </p:cNvPr>
+          <p:cNvSpPr txBox="1">
+            <a:spLocks noGrp="1"/>
+          </p:cNvSpPr>
+          <p:nvPr>
+            <p:ph type="body" idx="1"/>
+          </p:nvPr>
+        </p:nvSpPr>
+        <p:spPr>
+          <a:xfrm>
+            <a:off x="685800" y="4343400"/>
+            <a:ext cx="5486400" cy="4114800"/>
+          </a:xfrm>
+          <a:prstGeom prst="rect">
+            <a:avLst/>
+          </a:prstGeom>
+        </p:spPr>
+        <p:txBody>
+          <a:bodyPr spcFirstLastPara="1" wrap="square" lIns="91425" tIns="91425" rIns="91425" bIns="91425" anchor="t" anchorCtr="0">
+            <a:noAutofit/>
+          </a:bodyPr>
+          <a:lstStyle/>
+          <a:p>
+            <a:pPr marL="0" lvl="0" indent="0" algn="l" rtl="0">
+              <a:spcBef>
+                <a:spcPts val="0"/>
+              </a:spcBef>
+              <a:spcAft>
+                <a:spcPts val="0"/>
+              </a:spcAft>
+              <a:buNone/>
+            </a:pPr>
+            <a:endParaRPr/>
+          </a:p>
+        </p:txBody>
+      </p:sp>
+    </p:spTree>
+    <p:extLst>
+      <p:ext uri="{BB962C8B-B14F-4D97-AF65-F5344CB8AC3E}">
+        <p14:creationId xmlns:p14="http://schemas.microsoft.com/office/powerpoint/2010/main" val="350265695"/>
+      </p:ext>
+    </p:extLst>
+  </p:cSld>
+  <p:clrMapOvr>
+    <a:masterClrMapping/>
+  </p:clrMapOvr>
+</p:notes>
+</file>
+
+<file path=ppt/notesSlides/notesSlide16.xml><?xml version="1.0" encoding="utf-8"?>
+<p:notes xmlns:a="http://schemas.openxmlformats.org/drawingml/2006/main" xmlns:r="http://schemas.openxmlformats.org/officeDocument/2006/relationships" xmlns:p="http://schemas.openxmlformats.org/presentationml/2006/main" showMasterSp="0" showMasterPhAnim="0">
+  <p:cSld>
+    <p:spTree>
+      <p:nvGrpSpPr>
+        <p:cNvPr id="1" name="Shape 96">
+          <a:extLst>
+            <a:ext uri="{FF2B5EF4-FFF2-40B4-BE49-F238E27FC236}">
+              <a16:creationId xmlns:a16="http://schemas.microsoft.com/office/drawing/2014/main" id="{E3747C20-B4BA-FA13-EE9D-8370DFB34E18}"/>
+            </a:ext>
+          </a:extLst>
+        </p:cNvPr>
+        <p:cNvGrpSpPr/>
+        <p:nvPr/>
+      </p:nvGrpSpPr>
+      <p:grpSpPr>
+        <a:xfrm>
+          <a:off x="0" y="0"/>
+          <a:ext cx="0" cy="0"/>
+          <a:chOff x="0" y="0"/>
+          <a:chExt cx="0" cy="0"/>
+        </a:xfrm>
+      </p:grpSpPr>
+      <p:sp>
+        <p:nvSpPr>
+          <p:cNvPr id="97" name="Google Shape;97;g2a611630393_0_29:notes">
+            <a:extLst>
+              <a:ext uri="{FF2B5EF4-FFF2-40B4-BE49-F238E27FC236}">
+                <a16:creationId xmlns:a16="http://schemas.microsoft.com/office/drawing/2014/main" id="{1D3C4699-0393-EAB6-1374-47C9B0A7A21A}"/>
+              </a:ext>
+            </a:extLst>
+          </p:cNvPr>
+          <p:cNvSpPr>
+            <a:spLocks noGrp="1" noRot="1" noChangeAspect="1"/>
+          </p:cNvSpPr>
+          <p:nvPr>
+            <p:ph type="sldImg" idx="2"/>
+          </p:nvPr>
+        </p:nvSpPr>
+        <p:spPr>
+          <a:xfrm>
+            <a:off x="381000" y="685800"/>
+            <a:ext cx="6096000" cy="3429000"/>
+          </a:xfrm>
+          <a:custGeom>
+            <a:avLst/>
+            <a:gdLst/>
+            <a:ahLst/>
+            <a:cxnLst/>
+            <a:rect l="l" t="t" r="r" b="b"/>
+            <a:pathLst>
+              <a:path w="120000" h="120000" extrusionOk="0">
+                <a:moveTo>
+                  <a:pt x="0" y="0"/>
+                </a:moveTo>
+                <a:lnTo>
+                  <a:pt x="120000" y="0"/>
+                </a:lnTo>
+                <a:lnTo>
+                  <a:pt x="120000" y="120000"/>
+                </a:lnTo>
+                <a:lnTo>
+                  <a:pt x="0" y="120000"/>
+                </a:lnTo>
+                <a:close/>
+              </a:path>
+            </a:pathLst>
+          </a:custGeom>
+        </p:spPr>
+      </p:sp>
+      <p:sp>
+        <p:nvSpPr>
+          <p:cNvPr id="98" name="Google Shape;98;g2a611630393_0_29:notes">
+            <a:extLst>
+              <a:ext uri="{FF2B5EF4-FFF2-40B4-BE49-F238E27FC236}">
+                <a16:creationId xmlns:a16="http://schemas.microsoft.com/office/drawing/2014/main" id="{5556ABD9-8D44-1C08-62C4-3EE73AF93140}"/>
+              </a:ext>
+            </a:extLst>
+          </p:cNvPr>
+          <p:cNvSpPr txBox="1">
+            <a:spLocks noGrp="1"/>
+          </p:cNvSpPr>
+          <p:nvPr>
+            <p:ph type="body" idx="1"/>
+          </p:nvPr>
+        </p:nvSpPr>
+        <p:spPr>
+          <a:xfrm>
+            <a:off x="685800" y="4343400"/>
+            <a:ext cx="5486400" cy="4114800"/>
+          </a:xfrm>
+          <a:prstGeom prst="rect">
+            <a:avLst/>
+          </a:prstGeom>
+        </p:spPr>
+        <p:txBody>
+          <a:bodyPr spcFirstLastPara="1" wrap="square" lIns="91425" tIns="91425" rIns="91425" bIns="91425" anchor="t" anchorCtr="0">
+            <a:noAutofit/>
+          </a:bodyPr>
+          <a:lstStyle/>
+          <a:p>
+            <a:pPr marL="0" lvl="0" indent="0" algn="l" rtl="0">
+              <a:spcBef>
+                <a:spcPts val="0"/>
+              </a:spcBef>
+              <a:spcAft>
+                <a:spcPts val="0"/>
+              </a:spcAft>
+              <a:buNone/>
+            </a:pPr>
+            <a:endParaRPr/>
+          </a:p>
+        </p:txBody>
+      </p:sp>
+    </p:spTree>
+    <p:extLst>
+      <p:ext uri="{BB962C8B-B14F-4D97-AF65-F5344CB8AC3E}">
+        <p14:creationId xmlns:p14="http://schemas.microsoft.com/office/powerpoint/2010/main" val="3347817524"/>
+      </p:ext>
+    </p:extLst>
+  </p:cSld>
+  <p:clrMapOvr>
+    <a:masterClrMapping/>
+  </p:clrMapOvr>
+</p:notes>
+</file>
+
+<file path=ppt/notesSlides/notesSlide17.xml><?xml version="1.0" encoding="utf-8"?>
+<p:notes xmlns:a="http://schemas.openxmlformats.org/drawingml/2006/main" xmlns:r="http://schemas.openxmlformats.org/officeDocument/2006/relationships" xmlns:p="http://schemas.openxmlformats.org/presentationml/2006/main" showMasterSp="0" showMasterPhAnim="0">
+  <p:cSld>
+    <p:spTree>
+      <p:nvGrpSpPr>
+        <p:cNvPr id="1" name="Shape 96">
+          <a:extLst>
+            <a:ext uri="{FF2B5EF4-FFF2-40B4-BE49-F238E27FC236}">
+              <a16:creationId xmlns:a16="http://schemas.microsoft.com/office/drawing/2014/main" id="{751F977F-D3DC-1CB7-CD38-88D79543B69C}"/>
+            </a:ext>
+          </a:extLst>
+        </p:cNvPr>
+        <p:cNvGrpSpPr/>
+        <p:nvPr/>
+      </p:nvGrpSpPr>
+      <p:grpSpPr>
+        <a:xfrm>
+          <a:off x="0" y="0"/>
+          <a:ext cx="0" cy="0"/>
+          <a:chOff x="0" y="0"/>
+          <a:chExt cx="0" cy="0"/>
+        </a:xfrm>
+      </p:grpSpPr>
+      <p:sp>
+        <p:nvSpPr>
+          <p:cNvPr id="97" name="Google Shape;97;g2a611630393_0_29:notes">
+            <a:extLst>
+              <a:ext uri="{FF2B5EF4-FFF2-40B4-BE49-F238E27FC236}">
+                <a16:creationId xmlns:a16="http://schemas.microsoft.com/office/drawing/2014/main" id="{8490D1BB-A47C-D8F4-0E6B-88A46738B184}"/>
+              </a:ext>
+            </a:extLst>
+          </p:cNvPr>
+          <p:cNvSpPr>
+            <a:spLocks noGrp="1" noRot="1" noChangeAspect="1"/>
+          </p:cNvSpPr>
+          <p:nvPr>
+            <p:ph type="sldImg" idx="2"/>
+          </p:nvPr>
+        </p:nvSpPr>
+        <p:spPr>
+          <a:xfrm>
+            <a:off x="381000" y="685800"/>
+            <a:ext cx="6096000" cy="3429000"/>
+          </a:xfrm>
+          <a:custGeom>
+            <a:avLst/>
+            <a:gdLst/>
+            <a:ahLst/>
+            <a:cxnLst/>
+            <a:rect l="l" t="t" r="r" b="b"/>
+            <a:pathLst>
+              <a:path w="120000" h="120000" extrusionOk="0">
+                <a:moveTo>
+                  <a:pt x="0" y="0"/>
+                </a:moveTo>
+                <a:lnTo>
+                  <a:pt x="120000" y="0"/>
+                </a:lnTo>
+                <a:lnTo>
+                  <a:pt x="120000" y="120000"/>
+                </a:lnTo>
+                <a:lnTo>
+                  <a:pt x="0" y="120000"/>
+                </a:lnTo>
+                <a:close/>
+              </a:path>
+            </a:pathLst>
+          </a:custGeom>
+        </p:spPr>
+      </p:sp>
+      <p:sp>
+        <p:nvSpPr>
+          <p:cNvPr id="98" name="Google Shape;98;g2a611630393_0_29:notes">
+            <a:extLst>
+              <a:ext uri="{FF2B5EF4-FFF2-40B4-BE49-F238E27FC236}">
+                <a16:creationId xmlns:a16="http://schemas.microsoft.com/office/drawing/2014/main" id="{618593E9-18D6-F06B-3F83-B751ABA54B06}"/>
+              </a:ext>
+            </a:extLst>
+          </p:cNvPr>
+          <p:cNvSpPr txBox="1">
+            <a:spLocks noGrp="1"/>
+          </p:cNvSpPr>
+          <p:nvPr>
+            <p:ph type="body" idx="1"/>
+          </p:nvPr>
+        </p:nvSpPr>
+        <p:spPr>
+          <a:xfrm>
+            <a:off x="685800" y="4343400"/>
+            <a:ext cx="5486400" cy="4114800"/>
+          </a:xfrm>
+          <a:prstGeom prst="rect">
+            <a:avLst/>
+          </a:prstGeom>
+        </p:spPr>
+        <p:txBody>
+          <a:bodyPr spcFirstLastPara="1" wrap="square" lIns="91425" tIns="91425" rIns="91425" bIns="91425" anchor="t" anchorCtr="0">
+            <a:noAutofit/>
+          </a:bodyPr>
+          <a:lstStyle/>
+          <a:p>
+            <a:pPr marL="0" lvl="0" indent="0" algn="l" rtl="0">
+              <a:spcBef>
+                <a:spcPts val="0"/>
+              </a:spcBef>
+              <a:spcAft>
+                <a:spcPts val="0"/>
+              </a:spcAft>
+              <a:buNone/>
+            </a:pPr>
+            <a:endParaRPr/>
+          </a:p>
+        </p:txBody>
+      </p:sp>
+    </p:spTree>
+    <p:extLst>
+      <p:ext uri="{BB962C8B-B14F-4D97-AF65-F5344CB8AC3E}">
+        <p14:creationId xmlns:p14="http://schemas.microsoft.com/office/powerpoint/2010/main" val="3461597198"/>
       </p:ext>
     </p:extLst>
   </p:cSld>
@@ -8263,6 +8775,450 @@
 </p:sld>
 </file>
 
+<file path=ppt/slides/slide14.xml><?xml version="1.0" encoding="utf-8"?>
+<p:sld xmlns:a="http://schemas.openxmlformats.org/drawingml/2006/main" xmlns:r="http://schemas.openxmlformats.org/officeDocument/2006/relationships" xmlns:p="http://schemas.openxmlformats.org/presentationml/2006/main">
+  <p:cSld>
+    <p:spTree>
+      <p:nvGrpSpPr>
+        <p:cNvPr id="1" name="Shape 99">
+          <a:extLst>
+            <a:ext uri="{FF2B5EF4-FFF2-40B4-BE49-F238E27FC236}">
+              <a16:creationId xmlns:a16="http://schemas.microsoft.com/office/drawing/2014/main" id="{C17F1F97-BEF2-0E68-5DF6-8CF66F1FA23C}"/>
+            </a:ext>
+          </a:extLst>
+        </p:cNvPr>
+        <p:cNvGrpSpPr/>
+        <p:nvPr/>
+      </p:nvGrpSpPr>
+      <p:grpSpPr>
+        <a:xfrm>
+          <a:off x="0" y="0"/>
+          <a:ext cx="0" cy="0"/>
+          <a:chOff x="0" y="0"/>
+          <a:chExt cx="0" cy="0"/>
+        </a:xfrm>
+      </p:grpSpPr>
+      <p:sp>
+        <p:nvSpPr>
+          <p:cNvPr id="100" name="Google Shape;100;p21">
+            <a:extLst>
+              <a:ext uri="{FF2B5EF4-FFF2-40B4-BE49-F238E27FC236}">
+                <a16:creationId xmlns:a16="http://schemas.microsoft.com/office/drawing/2014/main" id="{C629607F-A5EC-7F57-DB69-752E67CF855D}"/>
+              </a:ext>
+            </a:extLst>
+          </p:cNvPr>
+          <p:cNvSpPr txBox="1">
+            <a:spLocks noGrp="1"/>
+          </p:cNvSpPr>
+          <p:nvPr>
+            <p:ph type="title"/>
+          </p:nvPr>
+        </p:nvSpPr>
+        <p:spPr>
+          <a:xfrm>
+            <a:off x="490250" y="526350"/>
+            <a:ext cx="8435100" cy="4090800"/>
+          </a:xfrm>
+          <a:prstGeom prst="rect">
+            <a:avLst/>
+          </a:prstGeom>
+        </p:spPr>
+        <p:txBody>
+          <a:bodyPr spcFirstLastPara="1" wrap="square" lIns="91425" tIns="91425" rIns="91425" bIns="91425" anchor="t" anchorCtr="0">
+            <a:noAutofit/>
+          </a:bodyPr>
+          <a:lstStyle/>
+          <a:p>
+            <a:pPr marL="0" lvl="0" indent="0" rtl="0">
+              <a:spcBef>
+                <a:spcPts val="0"/>
+              </a:spcBef>
+              <a:spcAft>
+                <a:spcPts val="0"/>
+              </a:spcAft>
+              <a:buNone/>
+            </a:pPr>
+            <a:r>
+              <a:rPr lang="it" sz="3000" dirty="0"/>
+              <a:t>2.0.0</a:t>
+            </a:r>
+            <a:br>
+              <a:rPr lang="it" sz="3000" dirty="0"/>
+            </a:br>
+            <a:r>
+              <a:rPr lang="it" sz="2000" dirty="0"/>
+              <a:t>Nell’applicativo sono presenti 5 schermate ogniuna collegata tramite link in sovraimpressione in app.</a:t>
+            </a:r>
+            <a:br>
+              <a:rPr lang="it" sz="2000" dirty="0"/>
+            </a:br>
+            <a:r>
+              <a:rPr lang="it" sz="2000" dirty="0"/>
+              <a:t>Login</a:t>
+            </a:r>
+            <a:br>
+              <a:rPr lang="it" sz="2000" dirty="0"/>
+            </a:br>
+            <a:r>
+              <a:rPr lang="it" sz="2000" dirty="0"/>
+              <a:t>Home page</a:t>
+            </a:r>
+            <a:br>
+              <a:rPr lang="it" sz="2000" dirty="0"/>
+            </a:br>
+            <a:r>
+              <a:rPr lang="it" sz="2000" dirty="0"/>
+              <a:t>Prenotazione aule</a:t>
+            </a:r>
+            <a:br>
+              <a:rPr lang="it" sz="2000" dirty="0"/>
+            </a:br>
+            <a:r>
+              <a:rPr lang="it" sz="2000" dirty="0"/>
+              <a:t>Utente</a:t>
+            </a:r>
+            <a:br>
+              <a:rPr lang="it" sz="2000" dirty="0"/>
+            </a:br>
+            <a:r>
+              <a:rPr lang="it" sz="2000" dirty="0"/>
+              <a:t>News</a:t>
+            </a:r>
+            <a:br>
+              <a:rPr lang="it" sz="2000" dirty="0"/>
+            </a:br>
+            <a:endParaRPr sz="2000" dirty="0"/>
+          </a:p>
+        </p:txBody>
+      </p:sp>
+    </p:spTree>
+    <p:extLst>
+      <p:ext uri="{BB962C8B-B14F-4D97-AF65-F5344CB8AC3E}">
+        <p14:creationId xmlns:p14="http://schemas.microsoft.com/office/powerpoint/2010/main" val="1026440416"/>
+      </p:ext>
+    </p:extLst>
+  </p:cSld>
+  <p:clrMapOvr>
+    <a:masterClrMapping/>
+  </p:clrMapOvr>
+</p:sld>
+</file>
+
+<file path=ppt/slides/slide15.xml><?xml version="1.0" encoding="utf-8"?>
+<p:sld xmlns:a="http://schemas.openxmlformats.org/drawingml/2006/main" xmlns:r="http://schemas.openxmlformats.org/officeDocument/2006/relationships" xmlns:p="http://schemas.openxmlformats.org/presentationml/2006/main">
+  <p:cSld>
+    <p:spTree>
+      <p:nvGrpSpPr>
+        <p:cNvPr id="1" name="Shape 99">
+          <a:extLst>
+            <a:ext uri="{FF2B5EF4-FFF2-40B4-BE49-F238E27FC236}">
+              <a16:creationId xmlns:a16="http://schemas.microsoft.com/office/drawing/2014/main" id="{D3E2CA84-2FBB-663F-A9CB-139DE49044E8}"/>
+            </a:ext>
+          </a:extLst>
+        </p:cNvPr>
+        <p:cNvGrpSpPr/>
+        <p:nvPr/>
+      </p:nvGrpSpPr>
+      <p:grpSpPr>
+        <a:xfrm>
+          <a:off x="0" y="0"/>
+          <a:ext cx="0" cy="0"/>
+          <a:chOff x="0" y="0"/>
+          <a:chExt cx="0" cy="0"/>
+        </a:xfrm>
+      </p:grpSpPr>
+      <p:sp>
+        <p:nvSpPr>
+          <p:cNvPr id="100" name="Google Shape;100;p21">
+            <a:extLst>
+              <a:ext uri="{FF2B5EF4-FFF2-40B4-BE49-F238E27FC236}">
+                <a16:creationId xmlns:a16="http://schemas.microsoft.com/office/drawing/2014/main" id="{B23ADC71-E819-18B0-2C6A-7F6B558B10B2}"/>
+              </a:ext>
+            </a:extLst>
+          </p:cNvPr>
+          <p:cNvSpPr txBox="1">
+            <a:spLocks noGrp="1"/>
+          </p:cNvSpPr>
+          <p:nvPr>
+            <p:ph type="title"/>
+          </p:nvPr>
+        </p:nvSpPr>
+        <p:spPr>
+          <a:xfrm>
+            <a:off x="490250" y="526350"/>
+            <a:ext cx="8435100" cy="4090800"/>
+          </a:xfrm>
+          <a:prstGeom prst="rect">
+            <a:avLst/>
+          </a:prstGeom>
+        </p:spPr>
+        <p:txBody>
+          <a:bodyPr spcFirstLastPara="1" wrap="square" lIns="91425" tIns="91425" rIns="91425" bIns="91425" anchor="t" anchorCtr="0">
+            <a:noAutofit/>
+          </a:bodyPr>
+          <a:lstStyle/>
+          <a:p>
+            <a:pPr marL="0" lvl="0" indent="0" rtl="0">
+              <a:spcBef>
+                <a:spcPts val="0"/>
+              </a:spcBef>
+              <a:spcAft>
+                <a:spcPts val="0"/>
+              </a:spcAft>
+              <a:buNone/>
+            </a:pPr>
+            <a:r>
+              <a:rPr lang="it" sz="3000" dirty="0"/>
+              <a:t>3.0.0</a:t>
+            </a:r>
+            <a:br>
+              <a:rPr lang="it" sz="3000" dirty="0"/>
+            </a:br>
+            <a:br>
+              <a:rPr lang="it" sz="2000" dirty="0"/>
+            </a:br>
+            <a:endParaRPr sz="2000" dirty="0"/>
+          </a:p>
+        </p:txBody>
+      </p:sp>
+      <p:pic>
+        <p:nvPicPr>
+          <p:cNvPr id="3" name="Immagine 2" descr="Immagine che contiene testo, diagramma, schermata, Piano&#10;&#10;Descrizione generata automaticamente">
+            <a:extLst>
+              <a:ext uri="{FF2B5EF4-FFF2-40B4-BE49-F238E27FC236}">
+                <a16:creationId xmlns:a16="http://schemas.microsoft.com/office/drawing/2014/main" id="{CBE37D30-ACFD-5E91-AFC6-583A16C87B4A}"/>
+              </a:ext>
+            </a:extLst>
+          </p:cNvPr>
+          <p:cNvPicPr>
+            <a:picLocks noChangeAspect="1"/>
+          </p:cNvPicPr>
+          <p:nvPr/>
+        </p:nvPicPr>
+        <p:blipFill>
+          <a:blip r:embed="rId3"/>
+          <a:stretch>
+            <a:fillRect/>
+          </a:stretch>
+        </p:blipFill>
+        <p:spPr>
+          <a:xfrm>
+            <a:off x="2213707" y="643200"/>
+            <a:ext cx="6711643" cy="4142901"/>
+          </a:xfrm>
+          <a:prstGeom prst="rect">
+            <a:avLst/>
+          </a:prstGeom>
+        </p:spPr>
+      </p:pic>
+    </p:spTree>
+    <p:extLst>
+      <p:ext uri="{BB962C8B-B14F-4D97-AF65-F5344CB8AC3E}">
+        <p14:creationId xmlns:p14="http://schemas.microsoft.com/office/powerpoint/2010/main" val="2482309136"/>
+      </p:ext>
+    </p:extLst>
+  </p:cSld>
+  <p:clrMapOvr>
+    <a:masterClrMapping/>
+  </p:clrMapOvr>
+</p:sld>
+</file>
+
+<file path=ppt/slides/slide16.xml><?xml version="1.0" encoding="utf-8"?>
+<p:sld xmlns:a="http://schemas.openxmlformats.org/drawingml/2006/main" xmlns:r="http://schemas.openxmlformats.org/officeDocument/2006/relationships" xmlns:p="http://schemas.openxmlformats.org/presentationml/2006/main">
+  <p:cSld>
+    <p:spTree>
+      <p:nvGrpSpPr>
+        <p:cNvPr id="1" name="Shape 99">
+          <a:extLst>
+            <a:ext uri="{FF2B5EF4-FFF2-40B4-BE49-F238E27FC236}">
+              <a16:creationId xmlns:a16="http://schemas.microsoft.com/office/drawing/2014/main" id="{D4059DE4-D0AF-E7F2-4D7E-0F8F4E0E6945}"/>
+            </a:ext>
+          </a:extLst>
+        </p:cNvPr>
+        <p:cNvGrpSpPr/>
+        <p:nvPr/>
+      </p:nvGrpSpPr>
+      <p:grpSpPr>
+        <a:xfrm>
+          <a:off x="0" y="0"/>
+          <a:ext cx="0" cy="0"/>
+          <a:chOff x="0" y="0"/>
+          <a:chExt cx="0" cy="0"/>
+        </a:xfrm>
+      </p:grpSpPr>
+      <p:sp>
+        <p:nvSpPr>
+          <p:cNvPr id="100" name="Google Shape;100;p21">
+            <a:extLst>
+              <a:ext uri="{FF2B5EF4-FFF2-40B4-BE49-F238E27FC236}">
+                <a16:creationId xmlns:a16="http://schemas.microsoft.com/office/drawing/2014/main" id="{735DF789-F1A1-9420-8A2A-3501F7028C5E}"/>
+              </a:ext>
+            </a:extLst>
+          </p:cNvPr>
+          <p:cNvSpPr txBox="1">
+            <a:spLocks noGrp="1"/>
+          </p:cNvSpPr>
+          <p:nvPr>
+            <p:ph type="title"/>
+          </p:nvPr>
+        </p:nvSpPr>
+        <p:spPr>
+          <a:xfrm>
+            <a:off x="490250" y="526350"/>
+            <a:ext cx="8435100" cy="4090800"/>
+          </a:xfrm>
+          <a:prstGeom prst="rect">
+            <a:avLst/>
+          </a:prstGeom>
+        </p:spPr>
+        <p:txBody>
+          <a:bodyPr spcFirstLastPara="1" wrap="square" lIns="91425" tIns="91425" rIns="91425" bIns="91425" anchor="t" anchorCtr="0">
+            <a:noAutofit/>
+          </a:bodyPr>
+          <a:lstStyle/>
+          <a:p>
+            <a:pPr marL="0" lvl="0" indent="0" rtl="0">
+              <a:spcBef>
+                <a:spcPts val="0"/>
+              </a:spcBef>
+              <a:spcAft>
+                <a:spcPts val="0"/>
+              </a:spcAft>
+              <a:buNone/>
+            </a:pPr>
+            <a:r>
+              <a:rPr lang="it" sz="3000" dirty="0"/>
+              <a:t>3.2</a:t>
+            </a:r>
+            <a:br>
+              <a:rPr lang="it" sz="3000" dirty="0"/>
+            </a:br>
+            <a:br>
+              <a:rPr lang="it" sz="3000" dirty="0"/>
+            </a:br>
+            <a:br>
+              <a:rPr lang="it" sz="3000" dirty="0"/>
+            </a:br>
+            <a:br>
+              <a:rPr lang="it" sz="2000" dirty="0"/>
+            </a:br>
+            <a:endParaRPr sz="2000" dirty="0"/>
+          </a:p>
+        </p:txBody>
+      </p:sp>
+    </p:spTree>
+    <p:extLst>
+      <p:ext uri="{BB962C8B-B14F-4D97-AF65-F5344CB8AC3E}">
+        <p14:creationId xmlns:p14="http://schemas.microsoft.com/office/powerpoint/2010/main" val="2282268848"/>
+      </p:ext>
+    </p:extLst>
+  </p:cSld>
+  <p:clrMapOvr>
+    <a:masterClrMapping/>
+  </p:clrMapOvr>
+</p:sld>
+</file>
+
+<file path=ppt/slides/slide17.xml><?xml version="1.0" encoding="utf-8"?>
+<p:sld xmlns:a="http://schemas.openxmlformats.org/drawingml/2006/main" xmlns:r="http://schemas.openxmlformats.org/officeDocument/2006/relationships" xmlns:p="http://schemas.openxmlformats.org/presentationml/2006/main">
+  <p:cSld>
+    <p:spTree>
+      <p:nvGrpSpPr>
+        <p:cNvPr id="1" name="Shape 99">
+          <a:extLst>
+            <a:ext uri="{FF2B5EF4-FFF2-40B4-BE49-F238E27FC236}">
+              <a16:creationId xmlns:a16="http://schemas.microsoft.com/office/drawing/2014/main" id="{7B62CD36-BA91-BC38-D8B7-D3563C9115A0}"/>
+            </a:ext>
+          </a:extLst>
+        </p:cNvPr>
+        <p:cNvGrpSpPr/>
+        <p:nvPr/>
+      </p:nvGrpSpPr>
+      <p:grpSpPr>
+        <a:xfrm>
+          <a:off x="0" y="0"/>
+          <a:ext cx="0" cy="0"/>
+          <a:chOff x="0" y="0"/>
+          <a:chExt cx="0" cy="0"/>
+        </a:xfrm>
+      </p:grpSpPr>
+      <p:sp>
+        <p:nvSpPr>
+          <p:cNvPr id="100" name="Google Shape;100;p21">
+            <a:extLst>
+              <a:ext uri="{FF2B5EF4-FFF2-40B4-BE49-F238E27FC236}">
+                <a16:creationId xmlns:a16="http://schemas.microsoft.com/office/drawing/2014/main" id="{BDFEC352-36DA-EAB7-CD91-5D46BB82A783}"/>
+              </a:ext>
+            </a:extLst>
+          </p:cNvPr>
+          <p:cNvSpPr txBox="1">
+            <a:spLocks noGrp="1"/>
+          </p:cNvSpPr>
+          <p:nvPr>
+            <p:ph type="title"/>
+          </p:nvPr>
+        </p:nvSpPr>
+        <p:spPr>
+          <a:xfrm>
+            <a:off x="490250" y="526350"/>
+            <a:ext cx="8435100" cy="4090800"/>
+          </a:xfrm>
+          <a:prstGeom prst="rect">
+            <a:avLst/>
+          </a:prstGeom>
+        </p:spPr>
+        <p:txBody>
+          <a:bodyPr spcFirstLastPara="1" wrap="square" lIns="91425" tIns="91425" rIns="91425" bIns="91425" anchor="t" anchorCtr="0">
+            <a:noAutofit/>
+          </a:bodyPr>
+          <a:lstStyle/>
+          <a:p>
+            <a:pPr marL="0" lvl="0" indent="0" rtl="0">
+              <a:spcBef>
+                <a:spcPts val="0"/>
+              </a:spcBef>
+              <a:spcAft>
+                <a:spcPts val="0"/>
+              </a:spcAft>
+              <a:buNone/>
+            </a:pPr>
+            <a:r>
+              <a:rPr lang="it" sz="3000" dirty="0"/>
+              <a:t>5.0.0 - Conclusioni</a:t>
+            </a:r>
+            <a:br>
+              <a:rPr lang="it" sz="3000" dirty="0"/>
+            </a:br>
+            <a:br>
+              <a:rPr lang="it" sz="3000" dirty="0"/>
+            </a:br>
+            <a:br>
+              <a:rPr lang="it" sz="3000" dirty="0"/>
+            </a:br>
+            <a:br>
+              <a:rPr lang="it" sz="3000" dirty="0"/>
+            </a:br>
+            <a:br>
+              <a:rPr lang="it" sz="2000" dirty="0"/>
+            </a:br>
+            <a:endParaRPr sz="2000" dirty="0"/>
+          </a:p>
+        </p:txBody>
+      </p:sp>
+    </p:spTree>
+    <p:extLst>
+      <p:ext uri="{BB962C8B-B14F-4D97-AF65-F5344CB8AC3E}">
+        <p14:creationId xmlns:p14="http://schemas.microsoft.com/office/powerpoint/2010/main" val="832892932"/>
+      </p:ext>
+    </p:extLst>
+  </p:cSld>
+  <p:clrMapOvr>
+    <a:masterClrMapping/>
+  </p:clrMapOvr>
+</p:sld>
+</file>
+
 <file path=ppt/slides/slide2.xml><?xml version="1.0" encoding="utf-8"?>
 <p:sld xmlns:a="http://schemas.openxmlformats.org/drawingml/2006/main" xmlns:r="http://schemas.openxmlformats.org/officeDocument/2006/relationships" xmlns:p="http://schemas.openxmlformats.org/presentationml/2006/main">
   <p:cSld>
@@ -9065,10 +10021,10 @@
               <a:buNone/>
             </a:pPr>
             <a:r>
-              <a:rPr lang="it" sz="3000"/>
+              <a:rPr lang="it" sz="3000" dirty="0"/>
               <a:t>1.1.0 Analisi Requisiti - Requisiti di sistema</a:t>
             </a:r>
-            <a:endParaRPr sz="3000"/>
+            <a:endParaRPr sz="3000" dirty="0"/>
           </a:p>
           <a:p>
             <a:pPr marL="0" lvl="0" indent="0" algn="just" rtl="0">
@@ -9081,10 +10037,10 @@
               <a:buNone/>
             </a:pPr>
             <a:r>
-              <a:rPr lang="it" sz="2000"/>
+              <a:rPr lang="it" sz="2000" dirty="0"/>
               <a:t>Non ci sono requisiti espliciti per l’utilizzo dell’applicazione</a:t>
             </a:r>
-            <a:endParaRPr sz="2000"/>
+            <a:endParaRPr sz="2000" dirty="0"/>
           </a:p>
         </p:txBody>
       </p:sp>

</xml_diff>

<commit_message>
[016] FIX report + ADD new project scheme
</commit_message>
<xml_diff>
--- a/others/Relazione UniBookMi.pptx
+++ b/others/Relazione UniBookMi.pptx
@@ -2089,7 +2089,7 @@
         </p:nvSpPr>
         <p:spPr>
           <a:xfrm>
-            <a:off x="381300" y="685800"/>
+            <a:off x="381000" y="685800"/>
             <a:ext cx="6096000" cy="3429000"/>
           </a:xfrm>
           <a:custGeom>
@@ -2193,7 +2193,7 @@
         </p:nvSpPr>
         <p:spPr>
           <a:xfrm>
-            <a:off x="381300" y="685800"/>
+            <a:off x="381000" y="685800"/>
             <a:ext cx="6096000" cy="3429000"/>
           </a:xfrm>
           <a:custGeom>
@@ -2297,7 +2297,7 @@
         </p:nvSpPr>
         <p:spPr>
           <a:xfrm>
-            <a:off x="381300" y="685800"/>
+            <a:off x="381000" y="685800"/>
             <a:ext cx="6096000" cy="3429000"/>
           </a:xfrm>
           <a:custGeom>
@@ -2401,7 +2401,7 @@
         </p:nvSpPr>
         <p:spPr>
           <a:xfrm>
-            <a:off x="381300" y="685800"/>
+            <a:off x="381000" y="685800"/>
             <a:ext cx="6096000" cy="3429000"/>
           </a:xfrm>
           <a:custGeom>
@@ -2505,7 +2505,7 @@
         </p:nvSpPr>
         <p:spPr>
           <a:xfrm>
-            <a:off x="381300" y="685800"/>
+            <a:off x="381000" y="685800"/>
             <a:ext cx="6096000" cy="3429000"/>
           </a:xfrm>
           <a:custGeom>
@@ -2609,7 +2609,7 @@
         </p:nvSpPr>
         <p:spPr>
           <a:xfrm>
-            <a:off x="381300" y="685800"/>
+            <a:off x="381000" y="685800"/>
             <a:ext cx="6096000" cy="3429000"/>
           </a:xfrm>
           <a:custGeom>
@@ -8409,6 +8409,9 @@
               </a:spcAft>
               <a:buNone/>
             </a:pPr>
+            <a:br>
+              <a:rPr lang="it-IT" sz="2000" dirty="0"/>
+            </a:br>
             <a:r>
               <a:rPr lang="it-IT" sz="2000" dirty="0"/>
               <a:t>L’applicazione WEB è prettamente per uso organizzativo, viene distribuita per utenti che ricercano una postazione o un aula di studio</a:t>
@@ -8519,6 +8522,9 @@
               </a:spcAft>
               <a:buNone/>
             </a:pPr>
+            <a:br>
+              <a:rPr lang="it-IT" sz="2000" dirty="0"/>
+            </a:br>
             <a:r>
               <a:rPr lang="it-IT" sz="2000" dirty="0"/>
               <a:t>I contenuti che danno valore all’applicazione sono le aule e le date che possono essere visionate per la prenotazione.</a:t>
@@ -8635,6 +8641,9 @@
             <a:br>
               <a:rPr lang="it" sz="3000" dirty="0"/>
             </a:br>
+            <a:br>
+              <a:rPr lang="it" sz="3000" dirty="0"/>
+            </a:br>
             <a:r>
               <a:rPr lang="it" sz="2000" dirty="0"/>
               <a:t>I contenuti sono standardizzati in base ad uno schema che si presenta ad ogni dipartimento a cui appartiene l’utente.</a:t>
@@ -8644,7 +8653,7 @@
             </a:br>
             <a:r>
               <a:rPr lang="it" sz="2000" dirty="0"/>
-              <a:t>Qualsiasi contenuto visionato è stato prodotto utilizzanod le informazioni dell’Università Statale di Milano, perciò non ci sono costi di produzione.</a:t>
+              <a:t>Qualsiasi contenuto visionato è stato prodotto utilizzando le informazioni dell’Università Statale di Milano, perciò non ci sono costi di produzione.</a:t>
             </a:r>
             <a:br>
               <a:rPr lang="it" sz="2000" dirty="0"/>
@@ -8737,6 +8746,9 @@
               <a:rPr lang="it" sz="3000" dirty="0"/>
               <a:t>1.1.4 Aspetti tecnologici</a:t>
             </a:r>
+            <a:br>
+              <a:rPr lang="it" sz="3000" dirty="0"/>
+            </a:br>
             <a:br>
               <a:rPr lang="it" sz="3000" dirty="0"/>
             </a:br>
@@ -8845,9 +8857,12 @@
             <a:br>
               <a:rPr lang="it" sz="3000" dirty="0"/>
             </a:br>
+            <a:br>
+              <a:rPr lang="it" sz="3000" dirty="0"/>
+            </a:br>
             <a:r>
               <a:rPr lang="it" sz="2000" dirty="0"/>
-              <a:t>Nell’applicativo sono presenti 5 schermate ogniuna collegata tramite link in sovraimpressione in app.</a:t>
+              <a:t>Nell’applicativo sono presenti 6 schermate ogniuna collegata tramite link in sovraimpressione in app.</a:t>
             </a:r>
             <a:br>
               <a:rPr lang="it" sz="2000" dirty="0"/>
@@ -8883,6 +8898,13 @@
             <a:r>
               <a:rPr lang="it" sz="2000" dirty="0"/>
               <a:t>News</a:t>
+            </a:r>
+            <a:br>
+              <a:rPr lang="it" sz="2000" dirty="0"/>
+            </a:br>
+            <a:r>
+              <a:rPr lang="it" sz="2000" dirty="0"/>
+              <a:t>Contatti</a:t>
             </a:r>
             <a:br>
               <a:rPr lang="it" sz="2000" dirty="0"/>
@@ -8983,10 +9005,10 @@
       </p:sp>
       <p:pic>
         <p:nvPicPr>
-          <p:cNvPr id="3" name="Immagine 2" descr="Immagine che contiene testo, diagramma, schermata, Piano&#10;&#10;Descrizione generata automaticamente">
+          <p:cNvPr id="4" name="Immagine 3" descr="Immagine che contiene testo, schermata, diagramma, Rettangolo&#10;&#10;Descrizione generata automaticamente">
             <a:extLst>
               <a:ext uri="{FF2B5EF4-FFF2-40B4-BE49-F238E27FC236}">
-                <a16:creationId xmlns:a16="http://schemas.microsoft.com/office/drawing/2014/main" id="{CBE37D30-ACFD-5E91-AFC6-583A16C87B4A}"/>
+                <a16:creationId xmlns:a16="http://schemas.microsoft.com/office/drawing/2014/main" id="{C0BB0700-4BB1-8F54-B70D-67EAD335D39B}"/>
               </a:ext>
             </a:extLst>
           </p:cNvPr>
@@ -9003,8 +9025,8 @@
         </p:blipFill>
         <p:spPr>
           <a:xfrm>
-            <a:off x="2213707" y="643200"/>
-            <a:ext cx="6711643" cy="4142901"/>
+            <a:off x="1772737" y="968278"/>
+            <a:ext cx="6881013" cy="3894816"/>
           </a:xfrm>
           <a:prstGeom prst="rect">
             <a:avLst/>
@@ -9089,16 +9111,139 @@
             </a:pPr>
             <a:r>
               <a:rPr lang="it" sz="3000" dirty="0"/>
-              <a:t>3.2</a:t>
+              <a:t>3.1 – 3.2 Risorse</a:t>
             </a:r>
             <a:br>
               <a:rPr lang="it" sz="3000" dirty="0"/>
             </a:br>
+            <a:r>
+              <a:rPr lang="it-IT" sz="2000" dirty="0"/>
+              <a:t>Tecnologie e framework: </a:t>
+            </a:r>
+            <a:r>
+              <a:rPr lang="it-IT" sz="2000" dirty="0" err="1"/>
+              <a:t>NodeJs</a:t>
+            </a:r>
+            <a:r>
+              <a:rPr lang="it-IT" sz="2000" dirty="0"/>
+              <a:t>, </a:t>
+            </a:r>
+            <a:r>
+              <a:rPr lang="it-IT" sz="2000" dirty="0" err="1"/>
+              <a:t>MySql</a:t>
+            </a:r>
+            <a:r>
+              <a:rPr lang="it-IT" sz="2000" dirty="0"/>
+              <a:t>, </a:t>
+            </a:r>
+            <a:r>
+              <a:rPr lang="it-IT" sz="2000" dirty="0" err="1"/>
+              <a:t>Express.js</a:t>
+            </a:r>
+            <a:r>
+              <a:rPr lang="it-IT" sz="2000" dirty="0"/>
+              <a:t>, </a:t>
+            </a:r>
+            <a:r>
+              <a:rPr lang="it-IT" sz="2000" dirty="0" err="1"/>
+              <a:t>javascript</a:t>
+            </a:r>
             <a:br>
-              <a:rPr lang="it" sz="3000" dirty="0"/>
+              <a:rPr lang="it-IT" sz="2000" dirty="0"/>
             </a:br>
+            <a:r>
+              <a:rPr lang="it-IT" sz="2000" dirty="0"/>
+              <a:t>Strumenti di sviluppo: Visual Studio Code, GitHub, </a:t>
+            </a:r>
+            <a:r>
+              <a:rPr lang="it-IT" sz="2000" dirty="0" err="1"/>
+              <a:t>Fork</a:t>
+            </a:r>
+            <a:r>
+              <a:rPr lang="it-IT" sz="2000" dirty="0"/>
+              <a:t> (</a:t>
+            </a:r>
+            <a:r>
+              <a:rPr lang="it-IT" sz="2000" dirty="0" err="1"/>
+              <a:t>git</a:t>
+            </a:r>
+            <a:r>
+              <a:rPr lang="it-IT" sz="2000" dirty="0"/>
+              <a:t> client)</a:t>
+            </a:r>
             <a:br>
-              <a:rPr lang="it" sz="3000" dirty="0"/>
+              <a:rPr lang="it-IT" sz="2000" dirty="0"/>
+            </a:br>
+            <a:r>
+              <a:rPr lang="it-IT" sz="2000" dirty="0" err="1"/>
+              <a:t>Hostato</a:t>
+            </a:r>
+            <a:r>
+              <a:rPr lang="it-IT" sz="2000" dirty="0"/>
+              <a:t> su </a:t>
+            </a:r>
+            <a:r>
+              <a:rPr lang="it-IT" sz="2000" dirty="0" err="1"/>
+              <a:t>Altervista</a:t>
+            </a:r>
+            <a:r>
+              <a:rPr lang="it-IT" sz="2000" dirty="0"/>
+              <a:t> </a:t>
+            </a:r>
+            <a:r>
+              <a:rPr lang="it-IT" sz="2000" dirty="0">
+                <a:hlinkClick r:id="rId3"/>
+              </a:rPr>
+              <a:t>https://www.unibookmi.altervista.org/</a:t>
+            </a:r>
+            <a:br>
+              <a:rPr lang="it" sz="2000" dirty="0">
+                <a:hlinkClick r:id="rId3"/>
+              </a:rPr>
+            </a:br>
+            <a:r>
+              <a:rPr lang="it" sz="2000" dirty="0"/>
+              <a:t>Contenuti e risorse multimediali: foto, video e colori presi da siti stock gratuiti</a:t>
+            </a:r>
+            <a:br>
+              <a:rPr lang="it" sz="2000" dirty="0"/>
+            </a:br>
+            <a:r>
+              <a:rPr lang="it" sz="2000" dirty="0"/>
+              <a:t>API: chiamate GET e POST con server locale Express e Node.js</a:t>
+            </a:r>
+            <a:br>
+              <a:rPr lang="it" sz="2000" dirty="0"/>
+            </a:br>
+            <a:r>
+              <a:rPr lang="it" sz="2000" dirty="0"/>
+              <a:t>Budget e spese: nessun budget previsto e nessuna spesa prevista</a:t>
+            </a:r>
+            <a:br>
+              <a:rPr lang="it" sz="2000" dirty="0"/>
+            </a:br>
+            <a:r>
+              <a:rPr lang="it" sz="2000" dirty="0"/>
+              <a:t>Tempistiche: inizio progetto </a:t>
+            </a:r>
+            <a:r>
+              <a:rPr lang="it-IT" sz="2000" dirty="0" err="1"/>
+              <a:t>Nov</a:t>
+            </a:r>
+            <a:r>
+              <a:rPr lang="it-IT" sz="2000" dirty="0"/>
+              <a:t> 25 2023, fine progetto </a:t>
+            </a:r>
+            <a:r>
+              <a:rPr lang="it-IT" sz="2000" dirty="0" err="1"/>
+              <a:t>Feb</a:t>
+            </a:r>
+            <a:r>
+              <a:rPr lang="it-IT" sz="2000" dirty="0"/>
+              <a:t> 20 2024</a:t>
+            </a:r>
+            <a:br>
+              <a:rPr lang="it" sz="2000" dirty="0"/>
             </a:br>
             <a:br>
               <a:rPr lang="it" sz="2000" dirty="0"/>
@@ -9507,10 +9652,10 @@
               <a:buNone/>
             </a:pPr>
             <a:r>
-              <a:rPr lang="it" sz="3000"/>
+              <a:rPr lang="it" sz="3000" dirty="0"/>
               <a:t>UniBookMi è un'applicazione web che consente la prenotazione di aule o stanze.</a:t>
             </a:r>
-            <a:endParaRPr sz="3000"/>
+            <a:endParaRPr sz="3000" dirty="0"/>
           </a:p>
           <a:p>
             <a:pPr marL="0" lvl="0" indent="0" algn="just" rtl="0">
@@ -9523,10 +9668,10 @@
               <a:buNone/>
             </a:pPr>
             <a:r>
-              <a:rPr lang="it" sz="3000"/>
-              <a:t>Questo avviene l’utilizzo di un account con mail Unimi e la scelta tramite piattaforma dell’aula e la data</a:t>
+              <a:rPr lang="it" sz="3000" dirty="0"/>
+              <a:t>Questo avviene con l’utilizzo di un account mail Unimi, le opzioni di prenotazione tramite piattaforma</a:t>
             </a:r>
-            <a:endParaRPr sz="3000"/>
+            <a:endParaRPr sz="3000" dirty="0"/>
           </a:p>
         </p:txBody>
       </p:sp>
@@ -9590,10 +9735,10 @@
               <a:buNone/>
             </a:pPr>
             <a:r>
-              <a:rPr lang="it" sz="3000"/>
+              <a:rPr lang="it" sz="3000" dirty="0"/>
               <a:t>1.1.0 Analisi Requisiti - Descrizione generale</a:t>
             </a:r>
-            <a:endParaRPr sz="3000"/>
+            <a:endParaRPr sz="3000" dirty="0"/>
           </a:p>
           <a:p>
             <a:pPr marL="0" lvl="0" indent="0" algn="just" rtl="0">
@@ -9605,7 +9750,7 @@
               </a:spcAft>
               <a:buNone/>
             </a:pPr>
-            <a:endParaRPr sz="1650" b="1">
+            <a:endParaRPr sz="1650" b="1" dirty="0">
               <a:solidFill>
                 <a:schemeClr val="dk1"/>
               </a:solidFill>
@@ -9629,10 +9774,10 @@
               <a:buNone/>
             </a:pPr>
             <a:r>
-              <a:rPr lang="it" sz="2000"/>
+              <a:rPr lang="it" sz="2000" dirty="0"/>
               <a:t>L’applicazione web dovrà consentire la prenotazione di stanze da parte di studenti o docenti tramite un apposito form.</a:t>
             </a:r>
-            <a:endParaRPr sz="2000"/>
+            <a:endParaRPr sz="2000" dirty="0"/>
           </a:p>
           <a:p>
             <a:pPr marL="0" lvl="0" indent="0" algn="just" rtl="0">
@@ -9645,13 +9790,13 @@
               <a:buNone/>
             </a:pPr>
             <a:r>
-              <a:rPr lang="it" sz="2000"/>
+              <a:rPr lang="it" sz="2000" dirty="0"/>
               <a:t>Le sezioni principali dell’app web sono</a:t>
             </a:r>
-            <a:endParaRPr sz="2000"/>
+            <a:endParaRPr sz="2000" dirty="0"/>
           </a:p>
           <a:p>
-            <a:pPr marL="0" lvl="0" indent="0" algn="just" rtl="0">
+            <a:pPr marL="0" lvl="0" indent="0" rtl="0">
               <a:spcBef>
                 <a:spcPts val="0"/>
               </a:spcBef>
@@ -9661,13 +9806,34 @@
               <a:buNone/>
             </a:pPr>
             <a:r>
-              <a:rPr lang="it" sz="2000"/>
-              <a:t>	-Login</a:t>
+              <a:rPr lang="it" sz="2000" dirty="0"/>
+              <a:t>-Login</a:t>
             </a:r>
-            <a:endParaRPr sz="2000"/>
+            <a:br>
+              <a:rPr lang="it" sz="2000" dirty="0"/>
+            </a:br>
+            <a:r>
+              <a:rPr lang="it" sz="2000" dirty="0"/>
+              <a:t>-Home page</a:t>
+            </a:r>
+            <a:br>
+              <a:rPr lang="it" sz="2000" dirty="0"/>
+            </a:br>
+            <a:r>
+              <a:rPr lang="it" sz="2000" dirty="0"/>
+              <a:t>-Pagina utente	</a:t>
+            </a:r>
+            <a:br>
+              <a:rPr lang="it" sz="2000" dirty="0"/>
+            </a:br>
+            <a:r>
+              <a:rPr lang="it" sz="2000" dirty="0"/>
+              <a:t>-Pagina contatti</a:t>
+            </a:r>
+            <a:endParaRPr sz="2000" dirty="0"/>
           </a:p>
           <a:p>
-            <a:pPr marL="0" lvl="0" indent="0" algn="just" rtl="0">
+            <a:pPr marL="0" lvl="0" indent="0" rtl="0">
               <a:spcBef>
                 <a:spcPts val="0"/>
               </a:spcBef>
@@ -9677,13 +9843,13 @@
               <a:buNone/>
             </a:pPr>
             <a:r>
-              <a:rPr lang="it" sz="2000"/>
-              <a:t>	-Home page</a:t>
+              <a:rPr lang="it" sz="2000" dirty="0"/>
+              <a:t>-Pagina prenotazione</a:t>
             </a:r>
-            <a:endParaRPr sz="2000"/>
+            <a:endParaRPr sz="2000" dirty="0"/>
           </a:p>
           <a:p>
-            <a:pPr marL="0" lvl="0" indent="0" algn="just" rtl="0">
+            <a:pPr marL="0" lvl="0" indent="0" rtl="0">
               <a:spcBef>
                 <a:spcPts val="0"/>
               </a:spcBef>
@@ -9693,42 +9859,10 @@
               <a:buNone/>
             </a:pPr>
             <a:r>
-              <a:rPr lang="it" sz="2000"/>
-              <a:t>	-Pagina utente</a:t>
+              <a:rPr lang="it" sz="2000" dirty="0"/>
+              <a:t>-Pagina News Statale</a:t>
             </a:r>
-            <a:endParaRPr sz="2000"/>
-          </a:p>
-          <a:p>
-            <a:pPr marL="0" lvl="0" indent="0" algn="just" rtl="0">
-              <a:spcBef>
-                <a:spcPts val="0"/>
-              </a:spcBef>
-              <a:spcAft>
-                <a:spcPts val="0"/>
-              </a:spcAft>
-              <a:buNone/>
-            </a:pPr>
-            <a:r>
-              <a:rPr lang="it" sz="2000"/>
-              <a:t>	-Pagina prenotazione</a:t>
-            </a:r>
-            <a:endParaRPr sz="2000"/>
-          </a:p>
-          <a:p>
-            <a:pPr marL="0" lvl="0" indent="0" algn="just" rtl="0">
-              <a:spcBef>
-                <a:spcPts val="0"/>
-              </a:spcBef>
-              <a:spcAft>
-                <a:spcPts val="0"/>
-              </a:spcAft>
-              <a:buNone/>
-            </a:pPr>
-            <a:r>
-              <a:rPr lang="it" sz="2000"/>
-              <a:t>	-News</a:t>
-            </a:r>
-            <a:endParaRPr sz="2000"/>
+            <a:endParaRPr sz="2000" dirty="0"/>
           </a:p>
         </p:txBody>
       </p:sp>
@@ -9792,10 +9926,10 @@
               <a:buNone/>
             </a:pPr>
             <a:r>
-              <a:rPr lang="it" sz="3000"/>
+              <a:rPr lang="it" sz="3000" dirty="0"/>
               <a:t>1.1.0 Analisi Requisiti - Requisiti funzionali</a:t>
             </a:r>
-            <a:endParaRPr sz="1650" b="1">
+            <a:endParaRPr sz="1650" b="1" dirty="0">
               <a:solidFill>
                 <a:schemeClr val="dk1"/>
               </a:solidFill>
@@ -9818,7 +9952,7 @@
               </a:spcAft>
               <a:buNone/>
             </a:pPr>
-            <a:endParaRPr sz="3000"/>
+            <a:endParaRPr sz="3000" dirty="0"/>
           </a:p>
           <a:p>
             <a:pPr marL="0" lvl="0" indent="0" algn="just" rtl="0">
@@ -9831,10 +9965,10 @@
               <a:buNone/>
             </a:pPr>
             <a:r>
-              <a:rPr lang="it" sz="2000"/>
-              <a:t>L’applicazione web una volta fatto il login tramite credenziali Unimi farà accedere alla schermata principale, dove vi è possibile navigare tra le due pagine principali, utente e prenotazione e la terza sezione extra, le notizie.</a:t>
+              <a:rPr lang="it" sz="2000" dirty="0"/>
+              <a:t>L’applicazione web una, volta fatto il login tramite credenziali Unimi, farà accedere alla schermata principale, dove vi è possibile navigare tra le pagine.</a:t>
             </a:r>
-            <a:endParaRPr sz="2000"/>
+            <a:endParaRPr sz="2000" dirty="0"/>
           </a:p>
           <a:p>
             <a:pPr marL="0" lvl="0" indent="0" algn="just" rtl="0">
@@ -9847,10 +9981,10 @@
               <a:buNone/>
             </a:pPr>
             <a:r>
-              <a:rPr lang="it" sz="2000"/>
-              <a:t>Quando il fruitore dell’app prenota una stanza, nella pagina utente è possibile visualizzare quest’ultima, comprese le prenotazioni passate.</a:t>
+              <a:rPr lang="it" sz="2000" dirty="0"/>
+              <a:t>Quando il fruitore dell’app prenota una stanza, nella pagina utente è possibile visualizzare quest’ultima.</a:t>
             </a:r>
-            <a:endParaRPr sz="2000"/>
+            <a:endParaRPr sz="2000" dirty="0"/>
           </a:p>
           <a:p>
             <a:pPr marL="0" lvl="0" indent="0" algn="just" rtl="0">
@@ -9862,7 +9996,7 @@
               </a:spcAft>
               <a:buNone/>
             </a:pPr>
-            <a:endParaRPr sz="2000"/>
+            <a:endParaRPr sz="2000" dirty="0"/>
           </a:p>
         </p:txBody>
       </p:sp>
@@ -9926,10 +10060,10 @@
               <a:buNone/>
             </a:pPr>
             <a:r>
-              <a:rPr lang="it" sz="3000"/>
+              <a:rPr lang="it" sz="3000" dirty="0"/>
               <a:t>1.1.0 Analisi Requisiti - Requisiti non funzionali</a:t>
             </a:r>
-            <a:endParaRPr sz="3000"/>
+            <a:endParaRPr sz="3000" dirty="0"/>
           </a:p>
           <a:p>
             <a:pPr marL="0" lvl="0" indent="0" algn="just" rtl="0">
@@ -9941,10 +10075,10 @@
               </a:spcAft>
               <a:buNone/>
             </a:pPr>
-            <a:endParaRPr sz="3000"/>
+            <a:endParaRPr sz="3000" dirty="0"/>
           </a:p>
           <a:p>
-            <a:pPr marL="0" lvl="0" indent="0" algn="just" rtl="0">
+            <a:pPr marL="0" lvl="0" indent="0" rtl="0">
               <a:spcBef>
                 <a:spcPts val="0"/>
               </a:spcBef>
@@ -9954,10 +10088,17 @@
               <a:buNone/>
             </a:pPr>
             <a:r>
-              <a:rPr lang="it" sz="2000"/>
-              <a:t>l’applicazione è usabile da tutti gli utenti, presenta un'interfaccia semplice con poche diramazioni</a:t>
+              <a:rPr lang="it" sz="2000" dirty="0"/>
+              <a:t>l’applicazione è usabile da tutti gli utenti, presenta un'interfaccia semplice e di facile intuizione.</a:t>
             </a:r>
-            <a:endParaRPr sz="2000"/>
+            <a:br>
+              <a:rPr lang="it" sz="2000" dirty="0"/>
+            </a:br>
+            <a:r>
+              <a:rPr lang="it" sz="2000" dirty="0"/>
+              <a:t>Viene semplice navigare all’interno delle schermate tramite bottoni che inoltrano a queste</a:t>
+            </a:r>
+            <a:endParaRPr sz="2000" dirty="0"/>
           </a:p>
         </p:txBody>
       </p:sp>
@@ -10036,9 +10177,12 @@
               </a:spcAft>
               <a:buNone/>
             </a:pPr>
+            <a:br>
+              <a:rPr lang="it" sz="2000" dirty="0"/>
+            </a:br>
             <a:r>
               <a:rPr lang="it" sz="2000" dirty="0"/>
-              <a:t>Non ci sono requisiti espliciti per l’utilizzo dell’applicazione</a:t>
+              <a:t>Bisogna poter essere connessi ad internet e avere un account unimi per utilizzare la web app</a:t>
             </a:r>
             <a:endParaRPr sz="2000" dirty="0"/>
           </a:p>
@@ -10104,10 +10248,10 @@
               <a:buNone/>
             </a:pPr>
             <a:r>
-              <a:rPr lang="it" sz="3000"/>
+              <a:rPr lang="it" sz="3000" dirty="0"/>
               <a:t>1.1.1 Destinatari</a:t>
             </a:r>
-            <a:endParaRPr sz="3000"/>
+            <a:endParaRPr sz="3000" dirty="0"/>
           </a:p>
           <a:p>
             <a:pPr marL="0" lvl="0" indent="0" algn="just" rtl="0">
@@ -10119,11 +10263,14 @@
               </a:spcAft>
               <a:buNone/>
             </a:pPr>
+            <a:br>
+              <a:rPr lang="it" sz="2000" dirty="0"/>
+            </a:br>
             <a:r>
-              <a:rPr lang="it" sz="2000"/>
+              <a:rPr lang="it" sz="2000" dirty="0"/>
               <a:t>L’applicazione web è designata per studenti e docenti dell’università Statale di Milano che vorranno prenotare le aule per attività didattiche.</a:t>
             </a:r>
-            <a:endParaRPr sz="2000"/>
+            <a:endParaRPr sz="2000" dirty="0"/>
           </a:p>
           <a:p>
             <a:pPr marL="0" lvl="0" indent="0" algn="just" rtl="0">
@@ -10136,10 +10283,10 @@
               <a:buNone/>
             </a:pPr>
             <a:r>
-              <a:rPr lang="it" sz="2000"/>
+              <a:rPr lang="it" sz="2000" dirty="0"/>
               <a:t>L’interfaccia è chiara ed intuibile e non sarà necessario avere conoscenze tecniche per poter effettuare le operazioni.</a:t>
             </a:r>
-            <a:endParaRPr sz="2000"/>
+            <a:endParaRPr sz="2000" dirty="0"/>
           </a:p>
           <a:p>
             <a:pPr marL="0" lvl="0" indent="0" algn="just" rtl="0">
@@ -10152,10 +10299,10 @@
               <a:buNone/>
             </a:pPr>
             <a:r>
-              <a:rPr lang="it" sz="2000"/>
+              <a:rPr lang="it" sz="2000" dirty="0"/>
               <a:t>Il device ottimizzato per l’utilizzo dell’applicazione è un computer, sia fisso che portatile</a:t>
             </a:r>
-            <a:endParaRPr sz="2000"/>
+            <a:endParaRPr sz="2000" dirty="0"/>
           </a:p>
         </p:txBody>
       </p:sp>

</xml_diff>